<commit_message>
Add VIX regresions for individual stocks
</commit_message>
<xml_diff>
--- a/presentation_material/Robinhood_Project.pptx
+++ b/presentation_material/Robinhood_Project.pptx
@@ -14430,7 +14430,7 @@
               </a:lnSpc>
             </a:pPr>
             <a:r>
-              <a:rPr lang="en-US" sz="3200" b="0" i="0" kern="1200">
+              <a:rPr lang="en-US" sz="3200" b="0" i="0" kern="1200" dirty="0">
                 <a:solidFill>
                   <a:srgbClr val="EBEBEB"/>
                 </a:solidFill>
@@ -14438,7 +14438,7 @@
                 <a:ea typeface="+mj-ea"/>
                 <a:cs typeface="+mj-cs"/>
               </a:rPr>
-              <a:t>One notable example: Faceook</a:t>
+              <a:t>One notable example: Facebook</a:t>
             </a:r>
           </a:p>
         </p:txBody>
@@ -15353,7 +15353,7 @@
               <a:buChar char=""/>
             </a:pPr>
             <a:r>
-              <a:rPr lang="en-US" sz="1400">
+              <a:rPr lang="en-US" sz="1400" dirty="0">
                 <a:solidFill>
                   <a:srgbClr val="FFFFFF"/>
                 </a:solidFill>
@@ -15379,14 +15379,44 @@
               <a:buFont typeface="Wingdings 3" charset="2"/>
               <a:buChar char=""/>
             </a:pPr>
-            <a:endParaRPr lang="en-US" sz="1400">
-              <a:solidFill>
-                <a:srgbClr val="FFFFFF"/>
-              </a:solidFill>
-              <a:latin typeface="+mj-lt"/>
-              <a:ea typeface="+mj-ea"/>
-              <a:cs typeface="+mj-cs"/>
-            </a:endParaRPr>
+            <a:r>
+              <a:rPr lang="en-US" sz="1400" dirty="0">
+                <a:solidFill>
+                  <a:srgbClr val="FFFFFF"/>
+                </a:solidFill>
+                <a:latin typeface="+mj-lt"/>
+                <a:ea typeface="+mj-ea"/>
+                <a:cs typeface="+mj-cs"/>
+              </a:rPr>
+              <a:t>They reduced positions over the following months as the price kept declining</a:t>
+            </a:r>
+          </a:p>
+          <a:p>
+            <a:pPr>
+              <a:spcBef>
+                <a:spcPts val="1000"/>
+              </a:spcBef>
+              <a:buClr>
+                <a:schemeClr val="bg2">
+                  <a:lumMod val="40000"/>
+                  <a:lumOff val="60000"/>
+                </a:schemeClr>
+              </a:buClr>
+              <a:buSzPct val="80000"/>
+              <a:buFont typeface="Wingdings 3" charset="2"/>
+              <a:buChar char=""/>
+            </a:pPr>
+            <a:r>
+              <a:rPr lang="en-US" sz="1400" dirty="0">
+                <a:solidFill>
+                  <a:srgbClr val="FFFFFF"/>
+                </a:solidFill>
+                <a:latin typeface="+mj-lt"/>
+                <a:ea typeface="+mj-ea"/>
+                <a:cs typeface="+mj-cs"/>
+              </a:rPr>
+              <a:t>Many more examples for popular and unpopular stocks available in Appendix (see the given Repository)</a:t>
+            </a:r>
           </a:p>
         </p:txBody>
       </p:sp>
@@ -15438,6 +15468,14 @@
 <file path=ppt/slides/slide14.xml><?xml version="1.0" encoding="utf-8"?>
 <p:sld xmlns:a="http://schemas.openxmlformats.org/drawingml/2006/main" xmlns:r="http://schemas.openxmlformats.org/officeDocument/2006/relationships" xmlns:p="http://schemas.openxmlformats.org/presentationml/2006/main">
   <p:cSld>
+    <p:bg>
+      <p:bgPr>
+        <a:solidFill>
+          <a:schemeClr val="bg1"/>
+        </a:solidFill>
+        <a:effectLst/>
+      </p:bgPr>
+    </p:bg>
     <p:spTree>
       <p:nvGrpSpPr>
         <p:cNvPr id="1" name=""/>
@@ -15454,6 +15492,66 @@
       </p:grpSpPr>
       <p:sp>
         <p:nvSpPr>
+          <p:cNvPr id="11" name="Rectangle 10">
+            <a:extLst>
+              <a:ext uri="{FF2B5EF4-FFF2-40B4-BE49-F238E27FC236}">
+                <a16:creationId xmlns:a16="http://schemas.microsoft.com/office/drawing/2014/main" id="{5F3FC718-FDE3-4EF7-921E-A5F374EAF824}"/>
+              </a:ext>
+              <a:ext uri="{C183D7F6-B498-43B3-948B-1728B52AA6E4}">
+                <adec:decorative xmlns:adec="http://schemas.microsoft.com/office/drawing/2017/decorative" val="1"/>
+              </a:ext>
+            </a:extLst>
+          </p:cNvPr>
+          <p:cNvSpPr>
+            <a:spLocks noGrp="1" noRot="1" noChangeAspect="1" noMove="1" noResize="1" noEditPoints="1" noAdjustHandles="1" noChangeArrowheads="1" noChangeShapeType="1" noTextEdit="1"/>
+          </p:cNvSpPr>
+          <p:nvPr>
+            <p:extLst>
+              <p:ext uri="{386F3935-93C4-4BCD-93E2-E3B085C9AB24}">
+                <p16:designElem xmlns:p16="http://schemas.microsoft.com/office/powerpoint/2015/main" val="1"/>
+              </p:ext>
+            </p:extLst>
+          </p:nvPr>
+        </p:nvSpPr>
+        <p:spPr>
+          <a:xfrm>
+            <a:off x="0" y="0"/>
+            <a:ext cx="12192000" cy="6858000"/>
+          </a:xfrm>
+          <a:prstGeom prst="rect">
+            <a:avLst/>
+          </a:prstGeom>
+          <a:ln>
+            <a:noFill/>
+          </a:ln>
+        </p:spPr>
+        <p:style>
+          <a:lnRef idx="2">
+            <a:schemeClr val="accent1">
+              <a:shade val="50000"/>
+            </a:schemeClr>
+          </a:lnRef>
+          <a:fillRef idx="1003">
+            <a:schemeClr val="dk2"/>
+          </a:fillRef>
+          <a:effectRef idx="0">
+            <a:schemeClr val="accent1"/>
+          </a:effectRef>
+          <a:fontRef idx="minor">
+            <a:schemeClr val="lt1"/>
+          </a:fontRef>
+        </p:style>
+        <p:txBody>
+          <a:bodyPr rtlCol="0" anchor="ctr"/>
+          <a:lstStyle/>
+          <a:p>
+            <a:pPr algn="ctr"/>
+            <a:endParaRPr lang="en-US"/>
+          </a:p>
+        </p:txBody>
+      </p:sp>
+      <p:sp>
+        <p:nvSpPr>
           <p:cNvPr id="2" name="Title 1">
             <a:extLst>
               <a:ext uri="{FF2B5EF4-FFF2-40B4-BE49-F238E27FC236}">
@@ -15468,13 +15566,32 @@
             <p:ph type="title"/>
           </p:nvPr>
         </p:nvSpPr>
-        <p:spPr/>
+        <p:spPr>
+          <a:xfrm>
+            <a:off x="643855" y="1447799"/>
+            <a:ext cx="3108626" cy="1444752"/>
+          </a:xfrm>
+        </p:spPr>
         <p:txBody>
-          <a:bodyPr/>
+          <a:bodyPr vert="horz" lIns="91440" tIns="45720" rIns="91440" bIns="45720" rtlCol="0" anchor="b">
+            <a:normAutofit/>
+          </a:bodyPr>
           <a:lstStyle/>
           <a:p>
+            <a:pPr>
+              <a:lnSpc>
+                <a:spcPct val="90000"/>
+              </a:lnSpc>
+            </a:pPr>
             <a:r>
-              <a:rPr lang="en-FR" dirty="0"/>
+              <a:rPr lang="en-US" sz="2200" b="0" i="0" kern="1200">
+                <a:solidFill>
+                  <a:srgbClr val="EBEBEB"/>
+                </a:solidFill>
+                <a:latin typeface="+mj-lt"/>
+                <a:ea typeface="+mj-ea"/>
+                <a:cs typeface="+mj-cs"/>
+              </a:rPr>
               <a:t>Does Robinhood bring more information than Market Volatility?</a:t>
             </a:r>
           </a:p>
@@ -15482,29 +15599,1566 @@
       </p:sp>
       <p:sp>
         <p:nvSpPr>
-          <p:cNvPr id="3" name="Content Placeholder 2">
+          <p:cNvPr id="13" name="Freeform 11">
             <a:extLst>
               <a:ext uri="{FF2B5EF4-FFF2-40B4-BE49-F238E27FC236}">
-                <a16:creationId xmlns:a16="http://schemas.microsoft.com/office/drawing/2014/main" id="{EC8F5127-C499-A547-9E5B-070A71B5225E}"/>
+                <a16:creationId xmlns:a16="http://schemas.microsoft.com/office/drawing/2014/main" id="{FAA0F719-3DC8-4F08-AD8F-5A845658CB9D}"/>
+              </a:ext>
+              <a:ext uri="{C183D7F6-B498-43B3-948B-1728B52AA6E4}">
+                <adec:decorative xmlns:adec="http://schemas.microsoft.com/office/drawing/2017/decorative" val="1"/>
               </a:ext>
             </a:extLst>
           </p:cNvPr>
           <p:cNvSpPr>
-            <a:spLocks noGrp="1"/>
+            <a:spLocks noGrp="1" noRot="1" noChangeAspect="1" noMove="1" noResize="1" noEditPoints="1" noAdjustHandles="1" noChangeArrowheads="1" noChangeShapeType="1" noTextEdit="1"/>
           </p:cNvSpPr>
+          <p:nvPr>
+            <p:extLst>
+              <p:ext uri="{386F3935-93C4-4BCD-93E2-E3B085C9AB24}">
+                <p16:designElem xmlns:p16="http://schemas.microsoft.com/office/powerpoint/2015/main" val="1"/>
+              </p:ext>
+            </p:extLst>
+          </p:nvPr>
+        </p:nvSpPr>
+        <p:spPr>
+          <a:xfrm>
+            <a:off x="3948110" y="-1"/>
+            <a:ext cx="559472" cy="3709642"/>
+          </a:xfrm>
+          <a:custGeom>
+            <a:avLst/>
+            <a:gdLst>
+              <a:gd name="connsiteX0" fmla="*/ 0 w 559472"/>
+              <a:gd name="connsiteY0" fmla="*/ 0 h 3709642"/>
+              <a:gd name="connsiteX1" fmla="*/ 473952 w 559472"/>
+              <a:gd name="connsiteY1" fmla="*/ 0 h 3709642"/>
+              <a:gd name="connsiteX2" fmla="*/ 485840 w 559472"/>
+              <a:gd name="connsiteY2" fmla="*/ 161194 h 3709642"/>
+              <a:gd name="connsiteX3" fmla="*/ 523949 w 559472"/>
+              <a:gd name="connsiteY3" fmla="*/ 3672197 h 3709642"/>
+              <a:gd name="connsiteX4" fmla="*/ 454748 w 559472"/>
+              <a:gd name="connsiteY4" fmla="*/ 3709642 h 3709642"/>
+              <a:gd name="connsiteX5" fmla="*/ 448224 w 559472"/>
+              <a:gd name="connsiteY5" fmla="*/ 3510471 h 3709642"/>
+              <a:gd name="connsiteX6" fmla="*/ 443564 w 559472"/>
+              <a:gd name="connsiteY6" fmla="*/ 3408563 h 3709642"/>
+              <a:gd name="connsiteX7" fmla="*/ 438902 w 559472"/>
+              <a:gd name="connsiteY7" fmla="*/ 3304407 h 3709642"/>
+              <a:gd name="connsiteX8" fmla="*/ 433941 w 559472"/>
+              <a:gd name="connsiteY8" fmla="*/ 3198777 h 3709642"/>
+              <a:gd name="connsiteX9" fmla="*/ 427584 w 559472"/>
+              <a:gd name="connsiteY9" fmla="*/ 3092510 h 3709642"/>
+              <a:gd name="connsiteX10" fmla="*/ 420988 w 559472"/>
+              <a:gd name="connsiteY10" fmla="*/ 2984390 h 3709642"/>
+              <a:gd name="connsiteX11" fmla="*/ 414330 w 559472"/>
+              <a:gd name="connsiteY11" fmla="*/ 2874401 h 3709642"/>
+              <a:gd name="connsiteX12" fmla="*/ 406840 w 559472"/>
+              <a:gd name="connsiteY12" fmla="*/ 2762980 h 3709642"/>
+              <a:gd name="connsiteX13" fmla="*/ 397745 w 559472"/>
+              <a:gd name="connsiteY13" fmla="*/ 2650566 h 3709642"/>
+              <a:gd name="connsiteX14" fmla="*/ 389154 w 559472"/>
+              <a:gd name="connsiteY14" fmla="*/ 2536612 h 3709642"/>
+              <a:gd name="connsiteX15" fmla="*/ 379225 w 559472"/>
+              <a:gd name="connsiteY15" fmla="*/ 2421642 h 3709642"/>
+              <a:gd name="connsiteX16" fmla="*/ 368316 w 559472"/>
+              <a:gd name="connsiteY16" fmla="*/ 2305627 h 3709642"/>
+              <a:gd name="connsiteX17" fmla="*/ 357466 w 559472"/>
+              <a:gd name="connsiteY17" fmla="*/ 2189233 h 3709642"/>
+              <a:gd name="connsiteX18" fmla="*/ 344982 w 559472"/>
+              <a:gd name="connsiteY18" fmla="*/ 2071473 h 3709642"/>
+              <a:gd name="connsiteX19" fmla="*/ 332466 w 559472"/>
+              <a:gd name="connsiteY19" fmla="*/ 1952216 h 3709642"/>
+              <a:gd name="connsiteX20" fmla="*/ 319121 w 559472"/>
+              <a:gd name="connsiteY20" fmla="*/ 1833776 h 3709642"/>
+              <a:gd name="connsiteX21" fmla="*/ 304408 w 559472"/>
+              <a:gd name="connsiteY21" fmla="*/ 1713948 h 3709642"/>
+              <a:gd name="connsiteX22" fmla="*/ 288685 w 559472"/>
+              <a:gd name="connsiteY22" fmla="*/ 1592703 h 3709642"/>
+              <a:gd name="connsiteX23" fmla="*/ 273050 w 559472"/>
+              <a:gd name="connsiteY23" fmla="*/ 1471451 h 3709642"/>
+              <a:gd name="connsiteX24" fmla="*/ 255813 w 559472"/>
+              <a:gd name="connsiteY24" fmla="*/ 1350328 h 3709642"/>
+              <a:gd name="connsiteX25" fmla="*/ 237060 w 559472"/>
+              <a:gd name="connsiteY25" fmla="*/ 1227080 h 3709642"/>
+              <a:gd name="connsiteX26" fmla="*/ 218488 w 559472"/>
+              <a:gd name="connsiteY26" fmla="*/ 1106065 h 3709642"/>
+              <a:gd name="connsiteX27" fmla="*/ 198221 w 559472"/>
+              <a:gd name="connsiteY27" fmla="*/ 982940 h 3709642"/>
+              <a:gd name="connsiteX28" fmla="*/ 177152 w 559472"/>
+              <a:gd name="connsiteY28" fmla="*/ 858755 h 3709642"/>
+              <a:gd name="connsiteX29" fmla="*/ 155551 w 559472"/>
+              <a:gd name="connsiteY29" fmla="*/ 736861 h 3709642"/>
+              <a:gd name="connsiteX30" fmla="*/ 131782 w 559472"/>
+              <a:gd name="connsiteY30" fmla="*/ 613645 h 3709642"/>
+              <a:gd name="connsiteX31" fmla="*/ 107123 w 559472"/>
+              <a:gd name="connsiteY31" fmla="*/ 490500 h 3709642"/>
+              <a:gd name="connsiteX32" fmla="*/ 82552 w 559472"/>
+              <a:gd name="connsiteY32" fmla="*/ 367348 h 3709642"/>
+              <a:gd name="connsiteX33" fmla="*/ 55608 w 559472"/>
+              <a:gd name="connsiteY33" fmla="*/ 244762 h 3709642"/>
+              <a:gd name="connsiteX34" fmla="*/ 28130 w 559472"/>
+              <a:gd name="connsiteY34" fmla="*/ 122220 h 3709642"/>
+              <a:gd name="connsiteX35" fmla="*/ 0 w 559472"/>
+              <a:gd name="connsiteY35" fmla="*/ 0 h 3709642"/>
+            </a:gdLst>
+            <a:ahLst/>
+            <a:cxnLst>
+              <a:cxn ang="0">
+                <a:pos x="connsiteX0" y="connsiteY0"/>
+              </a:cxn>
+              <a:cxn ang="0">
+                <a:pos x="connsiteX1" y="connsiteY1"/>
+              </a:cxn>
+              <a:cxn ang="0">
+                <a:pos x="connsiteX2" y="connsiteY2"/>
+              </a:cxn>
+              <a:cxn ang="0">
+                <a:pos x="connsiteX3" y="connsiteY3"/>
+              </a:cxn>
+              <a:cxn ang="0">
+                <a:pos x="connsiteX4" y="connsiteY4"/>
+              </a:cxn>
+              <a:cxn ang="0">
+                <a:pos x="connsiteX5" y="connsiteY5"/>
+              </a:cxn>
+              <a:cxn ang="0">
+                <a:pos x="connsiteX6" y="connsiteY6"/>
+              </a:cxn>
+              <a:cxn ang="0">
+                <a:pos x="connsiteX7" y="connsiteY7"/>
+              </a:cxn>
+              <a:cxn ang="0">
+                <a:pos x="connsiteX8" y="connsiteY8"/>
+              </a:cxn>
+              <a:cxn ang="0">
+                <a:pos x="connsiteX9" y="connsiteY9"/>
+              </a:cxn>
+              <a:cxn ang="0">
+                <a:pos x="connsiteX10" y="connsiteY10"/>
+              </a:cxn>
+              <a:cxn ang="0">
+                <a:pos x="connsiteX11" y="connsiteY11"/>
+              </a:cxn>
+              <a:cxn ang="0">
+                <a:pos x="connsiteX12" y="connsiteY12"/>
+              </a:cxn>
+              <a:cxn ang="0">
+                <a:pos x="connsiteX13" y="connsiteY13"/>
+              </a:cxn>
+              <a:cxn ang="0">
+                <a:pos x="connsiteX14" y="connsiteY14"/>
+              </a:cxn>
+              <a:cxn ang="0">
+                <a:pos x="connsiteX15" y="connsiteY15"/>
+              </a:cxn>
+              <a:cxn ang="0">
+                <a:pos x="connsiteX16" y="connsiteY16"/>
+              </a:cxn>
+              <a:cxn ang="0">
+                <a:pos x="connsiteX17" y="connsiteY17"/>
+              </a:cxn>
+              <a:cxn ang="0">
+                <a:pos x="connsiteX18" y="connsiteY18"/>
+              </a:cxn>
+              <a:cxn ang="0">
+                <a:pos x="connsiteX19" y="connsiteY19"/>
+              </a:cxn>
+              <a:cxn ang="0">
+                <a:pos x="connsiteX20" y="connsiteY20"/>
+              </a:cxn>
+              <a:cxn ang="0">
+                <a:pos x="connsiteX21" y="connsiteY21"/>
+              </a:cxn>
+              <a:cxn ang="0">
+                <a:pos x="connsiteX22" y="connsiteY22"/>
+              </a:cxn>
+              <a:cxn ang="0">
+                <a:pos x="connsiteX23" y="connsiteY23"/>
+              </a:cxn>
+              <a:cxn ang="0">
+                <a:pos x="connsiteX24" y="connsiteY24"/>
+              </a:cxn>
+              <a:cxn ang="0">
+                <a:pos x="connsiteX25" y="connsiteY25"/>
+              </a:cxn>
+              <a:cxn ang="0">
+                <a:pos x="connsiteX26" y="connsiteY26"/>
+              </a:cxn>
+              <a:cxn ang="0">
+                <a:pos x="connsiteX27" y="connsiteY27"/>
+              </a:cxn>
+              <a:cxn ang="0">
+                <a:pos x="connsiteX28" y="connsiteY28"/>
+              </a:cxn>
+              <a:cxn ang="0">
+                <a:pos x="connsiteX29" y="connsiteY29"/>
+              </a:cxn>
+              <a:cxn ang="0">
+                <a:pos x="connsiteX30" y="connsiteY30"/>
+              </a:cxn>
+              <a:cxn ang="0">
+                <a:pos x="connsiteX31" y="connsiteY31"/>
+              </a:cxn>
+              <a:cxn ang="0">
+                <a:pos x="connsiteX32" y="connsiteY32"/>
+              </a:cxn>
+              <a:cxn ang="0">
+                <a:pos x="connsiteX33" y="connsiteY33"/>
+              </a:cxn>
+              <a:cxn ang="0">
+                <a:pos x="connsiteX34" y="connsiteY34"/>
+              </a:cxn>
+              <a:cxn ang="0">
+                <a:pos x="connsiteX35" y="connsiteY35"/>
+              </a:cxn>
+            </a:cxnLst>
+            <a:rect l="l" t="t" r="r" b="b"/>
+            <a:pathLst>
+              <a:path w="559472" h="3709642">
+                <a:moveTo>
+                  <a:pt x="0" y="0"/>
+                </a:moveTo>
+                <a:lnTo>
+                  <a:pt x="473952" y="0"/>
+                </a:lnTo>
+                <a:lnTo>
+                  <a:pt x="485840" y="161194"/>
+                </a:lnTo>
+                <a:cubicBezTo>
+                  <a:pt x="552063" y="1147770"/>
+                  <a:pt x="592441" y="3086737"/>
+                  <a:pt x="523949" y="3672197"/>
+                </a:cubicBezTo>
+                <a:cubicBezTo>
+                  <a:pt x="500842" y="3684557"/>
+                  <a:pt x="477855" y="3697282"/>
+                  <a:pt x="454748" y="3709642"/>
+                </a:cubicBezTo>
+                <a:lnTo>
+                  <a:pt x="448224" y="3510471"/>
+                </a:lnTo>
+                <a:lnTo>
+                  <a:pt x="443564" y="3408563"/>
+                </a:lnTo>
+                <a:lnTo>
+                  <a:pt x="438902" y="3304407"/>
+                </a:lnTo>
+                <a:lnTo>
+                  <a:pt x="433941" y="3198777"/>
+                </a:lnTo>
+                <a:lnTo>
+                  <a:pt x="427584" y="3092510"/>
+                </a:lnTo>
+                <a:lnTo>
+                  <a:pt x="420988" y="2984390"/>
+                </a:lnTo>
+                <a:lnTo>
+                  <a:pt x="414330" y="2874401"/>
+                </a:lnTo>
+                <a:lnTo>
+                  <a:pt x="406840" y="2762980"/>
+                </a:lnTo>
+                <a:lnTo>
+                  <a:pt x="397745" y="2650566"/>
+                </a:lnTo>
+                <a:lnTo>
+                  <a:pt x="389154" y="2536612"/>
+                </a:lnTo>
+                <a:lnTo>
+                  <a:pt x="379225" y="2421642"/>
+                </a:lnTo>
+                <a:lnTo>
+                  <a:pt x="368316" y="2305627"/>
+                </a:lnTo>
+                <a:lnTo>
+                  <a:pt x="357466" y="2189233"/>
+                </a:lnTo>
+                <a:lnTo>
+                  <a:pt x="344982" y="2071473"/>
+                </a:lnTo>
+                <a:lnTo>
+                  <a:pt x="332466" y="1952216"/>
+                </a:lnTo>
+                <a:lnTo>
+                  <a:pt x="319121" y="1833776"/>
+                </a:lnTo>
+                <a:lnTo>
+                  <a:pt x="304408" y="1713948"/>
+                </a:lnTo>
+                <a:lnTo>
+                  <a:pt x="288685" y="1592703"/>
+                </a:lnTo>
+                <a:lnTo>
+                  <a:pt x="273050" y="1471451"/>
+                </a:lnTo>
+                <a:lnTo>
+                  <a:pt x="255813" y="1350328"/>
+                </a:lnTo>
+                <a:lnTo>
+                  <a:pt x="237060" y="1227080"/>
+                </a:lnTo>
+                <a:lnTo>
+                  <a:pt x="218488" y="1106065"/>
+                </a:lnTo>
+                <a:lnTo>
+                  <a:pt x="198221" y="982940"/>
+                </a:lnTo>
+                <a:lnTo>
+                  <a:pt x="177152" y="858755"/>
+                </a:lnTo>
+                <a:lnTo>
+                  <a:pt x="155551" y="736861"/>
+                </a:lnTo>
+                <a:lnTo>
+                  <a:pt x="131782" y="613645"/>
+                </a:lnTo>
+                <a:lnTo>
+                  <a:pt x="107123" y="490500"/>
+                </a:lnTo>
+                <a:lnTo>
+                  <a:pt x="82552" y="367348"/>
+                </a:lnTo>
+                <a:lnTo>
+                  <a:pt x="55608" y="244762"/>
+                </a:lnTo>
+                <a:lnTo>
+                  <a:pt x="28130" y="122220"/>
+                </a:lnTo>
+                <a:lnTo>
+                  <a:pt x="0" y="0"/>
+                </a:lnTo>
+                <a:close/>
+              </a:path>
+            </a:pathLst>
+          </a:custGeom>
+          <a:solidFill>
+            <a:schemeClr val="bg1">
+              <a:alpha val="20000"/>
+            </a:schemeClr>
+          </a:solidFill>
+          <a:ln>
+            <a:noFill/>
+          </a:ln>
+        </p:spPr>
+        <p:txBody>
+          <a:bodyPr rtlCol="0" anchor="ctr"/>
+          <a:lstStyle/>
+          <a:p>
+            <a:pPr algn="ctr"/>
+            <a:endParaRPr lang="en-US"/>
+          </a:p>
+        </p:txBody>
+      </p:sp>
+      <p:sp useBgFill="1">
+        <p:nvSpPr>
+          <p:cNvPr id="15" name="Freeform: Shape 14">
+            <a:extLst>
+              <a:ext uri="{FF2B5EF4-FFF2-40B4-BE49-F238E27FC236}">
+                <a16:creationId xmlns:a16="http://schemas.microsoft.com/office/drawing/2014/main" id="{7DCB61BE-FA0F-4EFB-BE0E-268BAD8E30D6}"/>
+              </a:ext>
+              <a:ext uri="{C183D7F6-B498-43B3-948B-1728B52AA6E4}">
+                <adec:decorative xmlns:adec="http://schemas.microsoft.com/office/drawing/2017/decorative" val="1"/>
+              </a:ext>
+            </a:extLst>
+          </p:cNvPr>
+          <p:cNvSpPr>
+            <a:spLocks noGrp="1" noRot="1" noChangeAspect="1" noMove="1" noResize="1" noEditPoints="1" noAdjustHandles="1" noChangeArrowheads="1" noChangeShapeType="1" noTextEdit="1"/>
+          </p:cNvSpPr>
+          <p:nvPr>
+            <p:extLst>
+              <p:ext uri="{386F3935-93C4-4BCD-93E2-E3B085C9AB24}">
+                <p16:designElem xmlns:p16="http://schemas.microsoft.com/office/powerpoint/2015/main" val="1"/>
+              </p:ext>
+            </p:extLst>
+          </p:nvPr>
+        </p:nvSpPr>
+        <p:spPr bwMode="gray">
+          <a:xfrm rot="16200000">
+            <a:off x="4747655" y="-586345"/>
+            <a:ext cx="6858001" cy="8030691"/>
+          </a:xfrm>
+          <a:custGeom>
+            <a:avLst/>
+            <a:gdLst>
+              <a:gd name="connsiteX0" fmla="*/ 6858001 w 6858001"/>
+              <a:gd name="connsiteY0" fmla="*/ 1177 h 8030691"/>
+              <a:gd name="connsiteX1" fmla="*/ 6858001 w 6858001"/>
+              <a:gd name="connsiteY1" fmla="*/ 1344715 h 8030691"/>
+              <a:gd name="connsiteX2" fmla="*/ 6858000 w 6858001"/>
+              <a:gd name="connsiteY2" fmla="*/ 1344715 h 8030691"/>
+              <a:gd name="connsiteX3" fmla="*/ 6858000 w 6858001"/>
+              <a:gd name="connsiteY3" fmla="*/ 8030691 h 8030691"/>
+              <a:gd name="connsiteX4" fmla="*/ 0 w 6858001"/>
+              <a:gd name="connsiteY4" fmla="*/ 8030690 h 8030691"/>
+              <a:gd name="connsiteX5" fmla="*/ 0 w 6858001"/>
+              <a:gd name="connsiteY5" fmla="*/ 477747 h 8030691"/>
+              <a:gd name="connsiteX6" fmla="*/ 1 w 6858001"/>
+              <a:gd name="connsiteY6" fmla="*/ 477747 h 8030691"/>
+              <a:gd name="connsiteX7" fmla="*/ 1 w 6858001"/>
+              <a:gd name="connsiteY7" fmla="*/ 0 h 8030691"/>
+              <a:gd name="connsiteX8" fmla="*/ 40463 w 6858001"/>
+              <a:gd name="connsiteY8" fmla="*/ 5883 h 8030691"/>
+              <a:gd name="connsiteX9" fmla="*/ 159107 w 6858001"/>
+              <a:gd name="connsiteY9" fmla="*/ 23196 h 8030691"/>
+              <a:gd name="connsiteX10" fmla="*/ 245518 w 6858001"/>
+              <a:gd name="connsiteY10" fmla="*/ 35299 h 8030691"/>
+              <a:gd name="connsiteX11" fmla="*/ 348388 w 6858001"/>
+              <a:gd name="connsiteY11" fmla="*/ 48074 h 8030691"/>
+              <a:gd name="connsiteX12" fmla="*/ 470460 w 6858001"/>
+              <a:gd name="connsiteY12" fmla="*/ 63370 h 8030691"/>
+              <a:gd name="connsiteX13" fmla="*/ 605563 w 6858001"/>
+              <a:gd name="connsiteY13" fmla="*/ 79507 h 8030691"/>
+              <a:gd name="connsiteX14" fmla="*/ 757810 w 6858001"/>
+              <a:gd name="connsiteY14" fmla="*/ 96484 h 8030691"/>
+              <a:gd name="connsiteX15" fmla="*/ 923774 w 6858001"/>
+              <a:gd name="connsiteY15" fmla="*/ 114469 h 8030691"/>
+              <a:gd name="connsiteX16" fmla="*/ 1104139 w 6858001"/>
+              <a:gd name="connsiteY16" fmla="*/ 132455 h 8030691"/>
+              <a:gd name="connsiteX17" fmla="*/ 1296163 w 6858001"/>
+              <a:gd name="connsiteY17" fmla="*/ 150776 h 8030691"/>
+              <a:gd name="connsiteX18" fmla="*/ 1503275 w 6858001"/>
+              <a:gd name="connsiteY18" fmla="*/ 167753 h 8030691"/>
+              <a:gd name="connsiteX19" fmla="*/ 1719988 w 6858001"/>
+              <a:gd name="connsiteY19" fmla="*/ 184058 h 8030691"/>
+              <a:gd name="connsiteX20" fmla="*/ 1949045 w 6858001"/>
+              <a:gd name="connsiteY20" fmla="*/ 198850 h 8030691"/>
+              <a:gd name="connsiteX21" fmla="*/ 2187703 w 6858001"/>
+              <a:gd name="connsiteY21" fmla="*/ 212969 h 8030691"/>
+              <a:gd name="connsiteX22" fmla="*/ 2436649 w 6858001"/>
+              <a:gd name="connsiteY22" fmla="*/ 226249 h 8030691"/>
+              <a:gd name="connsiteX23" fmla="*/ 2564208 w 6858001"/>
+              <a:gd name="connsiteY23" fmla="*/ 230955 h 8030691"/>
+              <a:gd name="connsiteX24" fmla="*/ 2694509 w 6858001"/>
+              <a:gd name="connsiteY24" fmla="*/ 236166 h 8030691"/>
+              <a:gd name="connsiteX25" fmla="*/ 2826869 w 6858001"/>
+              <a:gd name="connsiteY25" fmla="*/ 241040 h 8030691"/>
+              <a:gd name="connsiteX26" fmla="*/ 2959914 w 6858001"/>
+              <a:gd name="connsiteY26" fmla="*/ 244234 h 8030691"/>
+              <a:gd name="connsiteX27" fmla="*/ 3095702 w 6858001"/>
+              <a:gd name="connsiteY27" fmla="*/ 247092 h 8030691"/>
+              <a:gd name="connsiteX28" fmla="*/ 3232862 w 6858001"/>
+              <a:gd name="connsiteY28" fmla="*/ 250117 h 8030691"/>
+              <a:gd name="connsiteX29" fmla="*/ 3372766 w 6858001"/>
+              <a:gd name="connsiteY29" fmla="*/ 252134 h 8030691"/>
+              <a:gd name="connsiteX30" fmla="*/ 3514040 w 6858001"/>
+              <a:gd name="connsiteY30" fmla="*/ 252134 h 8030691"/>
+              <a:gd name="connsiteX31" fmla="*/ 3656686 w 6858001"/>
+              <a:gd name="connsiteY31" fmla="*/ 253143 h 8030691"/>
+              <a:gd name="connsiteX32" fmla="*/ 3800705 w 6858001"/>
+              <a:gd name="connsiteY32" fmla="*/ 252134 h 8030691"/>
+              <a:gd name="connsiteX33" fmla="*/ 3946780 w 6858001"/>
+              <a:gd name="connsiteY33" fmla="*/ 250117 h 8030691"/>
+              <a:gd name="connsiteX34" fmla="*/ 4092856 w 6858001"/>
+              <a:gd name="connsiteY34" fmla="*/ 248268 h 8030691"/>
+              <a:gd name="connsiteX35" fmla="*/ 4240988 w 6858001"/>
+              <a:gd name="connsiteY35" fmla="*/ 244234 h 8030691"/>
+              <a:gd name="connsiteX36" fmla="*/ 4390492 w 6858001"/>
+              <a:gd name="connsiteY36" fmla="*/ 240032 h 8030691"/>
+              <a:gd name="connsiteX37" fmla="*/ 4539997 w 6858001"/>
+              <a:gd name="connsiteY37" fmla="*/ 235157 h 8030691"/>
+              <a:gd name="connsiteX38" fmla="*/ 4690873 w 6858001"/>
+              <a:gd name="connsiteY38" fmla="*/ 228266 h 8030691"/>
+              <a:gd name="connsiteX39" fmla="*/ 4843120 w 6858001"/>
+              <a:gd name="connsiteY39" fmla="*/ 220029 h 8030691"/>
+              <a:gd name="connsiteX40" fmla="*/ 4996054 w 6858001"/>
+              <a:gd name="connsiteY40" fmla="*/ 212129 h 8030691"/>
+              <a:gd name="connsiteX41" fmla="*/ 5148987 w 6858001"/>
+              <a:gd name="connsiteY41" fmla="*/ 202044 h 8030691"/>
+              <a:gd name="connsiteX42" fmla="*/ 5303978 w 6858001"/>
+              <a:gd name="connsiteY42" fmla="*/ 189941 h 8030691"/>
+              <a:gd name="connsiteX43" fmla="*/ 5456911 w 6858001"/>
+              <a:gd name="connsiteY43" fmla="*/ 177839 h 8030691"/>
+              <a:gd name="connsiteX44" fmla="*/ 5612588 w 6858001"/>
+              <a:gd name="connsiteY44" fmla="*/ 163887 h 8030691"/>
+              <a:gd name="connsiteX45" fmla="*/ 5768950 w 6858001"/>
+              <a:gd name="connsiteY45" fmla="*/ 148591 h 8030691"/>
+              <a:gd name="connsiteX46" fmla="*/ 5923255 w 6858001"/>
+              <a:gd name="connsiteY46" fmla="*/ 132455 h 8030691"/>
+              <a:gd name="connsiteX47" fmla="*/ 6079618 w 6858001"/>
+              <a:gd name="connsiteY47" fmla="*/ 113629 h 8030691"/>
+              <a:gd name="connsiteX48" fmla="*/ 6235294 w 6858001"/>
+              <a:gd name="connsiteY48" fmla="*/ 93458 h 8030691"/>
+              <a:gd name="connsiteX49" fmla="*/ 6391657 w 6858001"/>
+              <a:gd name="connsiteY49" fmla="*/ 73455 h 8030691"/>
+              <a:gd name="connsiteX50" fmla="*/ 6547333 w 6858001"/>
+              <a:gd name="connsiteY50" fmla="*/ 50091 h 8030691"/>
+              <a:gd name="connsiteX51" fmla="*/ 6702324 w 6858001"/>
+              <a:gd name="connsiteY51" fmla="*/ 26222 h 8030691"/>
+            </a:gdLst>
+            <a:ahLst/>
+            <a:cxnLst>
+              <a:cxn ang="0">
+                <a:pos x="connsiteX0" y="connsiteY0"/>
+              </a:cxn>
+              <a:cxn ang="0">
+                <a:pos x="connsiteX1" y="connsiteY1"/>
+              </a:cxn>
+              <a:cxn ang="0">
+                <a:pos x="connsiteX2" y="connsiteY2"/>
+              </a:cxn>
+              <a:cxn ang="0">
+                <a:pos x="connsiteX3" y="connsiteY3"/>
+              </a:cxn>
+              <a:cxn ang="0">
+                <a:pos x="connsiteX4" y="connsiteY4"/>
+              </a:cxn>
+              <a:cxn ang="0">
+                <a:pos x="connsiteX5" y="connsiteY5"/>
+              </a:cxn>
+              <a:cxn ang="0">
+                <a:pos x="connsiteX6" y="connsiteY6"/>
+              </a:cxn>
+              <a:cxn ang="0">
+                <a:pos x="connsiteX7" y="connsiteY7"/>
+              </a:cxn>
+              <a:cxn ang="0">
+                <a:pos x="connsiteX8" y="connsiteY8"/>
+              </a:cxn>
+              <a:cxn ang="0">
+                <a:pos x="connsiteX9" y="connsiteY9"/>
+              </a:cxn>
+              <a:cxn ang="0">
+                <a:pos x="connsiteX10" y="connsiteY10"/>
+              </a:cxn>
+              <a:cxn ang="0">
+                <a:pos x="connsiteX11" y="connsiteY11"/>
+              </a:cxn>
+              <a:cxn ang="0">
+                <a:pos x="connsiteX12" y="connsiteY12"/>
+              </a:cxn>
+              <a:cxn ang="0">
+                <a:pos x="connsiteX13" y="connsiteY13"/>
+              </a:cxn>
+              <a:cxn ang="0">
+                <a:pos x="connsiteX14" y="connsiteY14"/>
+              </a:cxn>
+              <a:cxn ang="0">
+                <a:pos x="connsiteX15" y="connsiteY15"/>
+              </a:cxn>
+              <a:cxn ang="0">
+                <a:pos x="connsiteX16" y="connsiteY16"/>
+              </a:cxn>
+              <a:cxn ang="0">
+                <a:pos x="connsiteX17" y="connsiteY17"/>
+              </a:cxn>
+              <a:cxn ang="0">
+                <a:pos x="connsiteX18" y="connsiteY18"/>
+              </a:cxn>
+              <a:cxn ang="0">
+                <a:pos x="connsiteX19" y="connsiteY19"/>
+              </a:cxn>
+              <a:cxn ang="0">
+                <a:pos x="connsiteX20" y="connsiteY20"/>
+              </a:cxn>
+              <a:cxn ang="0">
+                <a:pos x="connsiteX21" y="connsiteY21"/>
+              </a:cxn>
+              <a:cxn ang="0">
+                <a:pos x="connsiteX22" y="connsiteY22"/>
+              </a:cxn>
+              <a:cxn ang="0">
+                <a:pos x="connsiteX23" y="connsiteY23"/>
+              </a:cxn>
+              <a:cxn ang="0">
+                <a:pos x="connsiteX24" y="connsiteY24"/>
+              </a:cxn>
+              <a:cxn ang="0">
+                <a:pos x="connsiteX25" y="connsiteY25"/>
+              </a:cxn>
+              <a:cxn ang="0">
+                <a:pos x="connsiteX26" y="connsiteY26"/>
+              </a:cxn>
+              <a:cxn ang="0">
+                <a:pos x="connsiteX27" y="connsiteY27"/>
+              </a:cxn>
+              <a:cxn ang="0">
+                <a:pos x="connsiteX28" y="connsiteY28"/>
+              </a:cxn>
+              <a:cxn ang="0">
+                <a:pos x="connsiteX29" y="connsiteY29"/>
+              </a:cxn>
+              <a:cxn ang="0">
+                <a:pos x="connsiteX30" y="connsiteY30"/>
+              </a:cxn>
+              <a:cxn ang="0">
+                <a:pos x="connsiteX31" y="connsiteY31"/>
+              </a:cxn>
+              <a:cxn ang="0">
+                <a:pos x="connsiteX32" y="connsiteY32"/>
+              </a:cxn>
+              <a:cxn ang="0">
+                <a:pos x="connsiteX33" y="connsiteY33"/>
+              </a:cxn>
+              <a:cxn ang="0">
+                <a:pos x="connsiteX34" y="connsiteY34"/>
+              </a:cxn>
+              <a:cxn ang="0">
+                <a:pos x="connsiteX35" y="connsiteY35"/>
+              </a:cxn>
+              <a:cxn ang="0">
+                <a:pos x="connsiteX36" y="connsiteY36"/>
+              </a:cxn>
+              <a:cxn ang="0">
+                <a:pos x="connsiteX37" y="connsiteY37"/>
+              </a:cxn>
+              <a:cxn ang="0">
+                <a:pos x="connsiteX38" y="connsiteY38"/>
+              </a:cxn>
+              <a:cxn ang="0">
+                <a:pos x="connsiteX39" y="connsiteY39"/>
+              </a:cxn>
+              <a:cxn ang="0">
+                <a:pos x="connsiteX40" y="connsiteY40"/>
+              </a:cxn>
+              <a:cxn ang="0">
+                <a:pos x="connsiteX41" y="connsiteY41"/>
+              </a:cxn>
+              <a:cxn ang="0">
+                <a:pos x="connsiteX42" y="connsiteY42"/>
+              </a:cxn>
+              <a:cxn ang="0">
+                <a:pos x="connsiteX43" y="connsiteY43"/>
+              </a:cxn>
+              <a:cxn ang="0">
+                <a:pos x="connsiteX44" y="connsiteY44"/>
+              </a:cxn>
+              <a:cxn ang="0">
+                <a:pos x="connsiteX45" y="connsiteY45"/>
+              </a:cxn>
+              <a:cxn ang="0">
+                <a:pos x="connsiteX46" y="connsiteY46"/>
+              </a:cxn>
+              <a:cxn ang="0">
+                <a:pos x="connsiteX47" y="connsiteY47"/>
+              </a:cxn>
+              <a:cxn ang="0">
+                <a:pos x="connsiteX48" y="connsiteY48"/>
+              </a:cxn>
+              <a:cxn ang="0">
+                <a:pos x="connsiteX49" y="connsiteY49"/>
+              </a:cxn>
+              <a:cxn ang="0">
+                <a:pos x="connsiteX50" y="connsiteY50"/>
+              </a:cxn>
+              <a:cxn ang="0">
+                <a:pos x="connsiteX51" y="connsiteY51"/>
+              </a:cxn>
+            </a:cxnLst>
+            <a:rect l="l" t="t" r="r" b="b"/>
+            <a:pathLst>
+              <a:path w="6858001" h="8030691">
+                <a:moveTo>
+                  <a:pt x="6858001" y="1177"/>
+                </a:moveTo>
+                <a:lnTo>
+                  <a:pt x="6858001" y="1344715"/>
+                </a:lnTo>
+                <a:lnTo>
+                  <a:pt x="6858000" y="1344715"/>
+                </a:lnTo>
+                <a:lnTo>
+                  <a:pt x="6858000" y="8030691"/>
+                </a:lnTo>
+                <a:lnTo>
+                  <a:pt x="0" y="8030690"/>
+                </a:lnTo>
+                <a:lnTo>
+                  <a:pt x="0" y="477747"/>
+                </a:lnTo>
+                <a:lnTo>
+                  <a:pt x="1" y="477747"/>
+                </a:lnTo>
+                <a:lnTo>
+                  <a:pt x="1" y="0"/>
+                </a:lnTo>
+                <a:lnTo>
+                  <a:pt x="40463" y="5883"/>
+                </a:lnTo>
+                <a:lnTo>
+                  <a:pt x="159107" y="23196"/>
+                </a:lnTo>
+                <a:lnTo>
+                  <a:pt x="245518" y="35299"/>
+                </a:lnTo>
+                <a:lnTo>
+                  <a:pt x="348388" y="48074"/>
+                </a:lnTo>
+                <a:lnTo>
+                  <a:pt x="470460" y="63370"/>
+                </a:lnTo>
+                <a:lnTo>
+                  <a:pt x="605563" y="79507"/>
+                </a:lnTo>
+                <a:lnTo>
+                  <a:pt x="757810" y="96484"/>
+                </a:lnTo>
+                <a:lnTo>
+                  <a:pt x="923774" y="114469"/>
+                </a:lnTo>
+                <a:lnTo>
+                  <a:pt x="1104139" y="132455"/>
+                </a:lnTo>
+                <a:lnTo>
+                  <a:pt x="1296163" y="150776"/>
+                </a:lnTo>
+                <a:lnTo>
+                  <a:pt x="1503275" y="167753"/>
+                </a:lnTo>
+                <a:lnTo>
+                  <a:pt x="1719988" y="184058"/>
+                </a:lnTo>
+                <a:lnTo>
+                  <a:pt x="1949045" y="198850"/>
+                </a:lnTo>
+                <a:lnTo>
+                  <a:pt x="2187703" y="212969"/>
+                </a:lnTo>
+                <a:lnTo>
+                  <a:pt x="2436649" y="226249"/>
+                </a:lnTo>
+                <a:lnTo>
+                  <a:pt x="2564208" y="230955"/>
+                </a:lnTo>
+                <a:lnTo>
+                  <a:pt x="2694509" y="236166"/>
+                </a:lnTo>
+                <a:lnTo>
+                  <a:pt x="2826869" y="241040"/>
+                </a:lnTo>
+                <a:lnTo>
+                  <a:pt x="2959914" y="244234"/>
+                </a:lnTo>
+                <a:lnTo>
+                  <a:pt x="3095702" y="247092"/>
+                </a:lnTo>
+                <a:lnTo>
+                  <a:pt x="3232862" y="250117"/>
+                </a:lnTo>
+                <a:lnTo>
+                  <a:pt x="3372766" y="252134"/>
+                </a:lnTo>
+                <a:lnTo>
+                  <a:pt x="3514040" y="252134"/>
+                </a:lnTo>
+                <a:lnTo>
+                  <a:pt x="3656686" y="253143"/>
+                </a:lnTo>
+                <a:lnTo>
+                  <a:pt x="3800705" y="252134"/>
+                </a:lnTo>
+                <a:lnTo>
+                  <a:pt x="3946780" y="250117"/>
+                </a:lnTo>
+                <a:lnTo>
+                  <a:pt x="4092856" y="248268"/>
+                </a:lnTo>
+                <a:lnTo>
+                  <a:pt x="4240988" y="244234"/>
+                </a:lnTo>
+                <a:lnTo>
+                  <a:pt x="4390492" y="240032"/>
+                </a:lnTo>
+                <a:lnTo>
+                  <a:pt x="4539997" y="235157"/>
+                </a:lnTo>
+                <a:lnTo>
+                  <a:pt x="4690873" y="228266"/>
+                </a:lnTo>
+                <a:lnTo>
+                  <a:pt x="4843120" y="220029"/>
+                </a:lnTo>
+                <a:lnTo>
+                  <a:pt x="4996054" y="212129"/>
+                </a:lnTo>
+                <a:lnTo>
+                  <a:pt x="5148987" y="202044"/>
+                </a:lnTo>
+                <a:lnTo>
+                  <a:pt x="5303978" y="189941"/>
+                </a:lnTo>
+                <a:lnTo>
+                  <a:pt x="5456911" y="177839"/>
+                </a:lnTo>
+                <a:lnTo>
+                  <a:pt x="5612588" y="163887"/>
+                </a:lnTo>
+                <a:lnTo>
+                  <a:pt x="5768950" y="148591"/>
+                </a:lnTo>
+                <a:lnTo>
+                  <a:pt x="5923255" y="132455"/>
+                </a:lnTo>
+                <a:lnTo>
+                  <a:pt x="6079618" y="113629"/>
+                </a:lnTo>
+                <a:lnTo>
+                  <a:pt x="6235294" y="93458"/>
+                </a:lnTo>
+                <a:lnTo>
+                  <a:pt x="6391657" y="73455"/>
+                </a:lnTo>
+                <a:lnTo>
+                  <a:pt x="6547333" y="50091"/>
+                </a:lnTo>
+                <a:lnTo>
+                  <a:pt x="6702324" y="26222"/>
+                </a:lnTo>
+                <a:close/>
+              </a:path>
+            </a:pathLst>
+          </a:custGeom>
+          <a:ln>
+            <a:noFill/>
+          </a:ln>
+        </p:spPr>
+      </p:sp>
+      <p:sp>
+        <p:nvSpPr>
+          <p:cNvPr id="17" name="Rectangle 16">
+            <a:extLst>
+              <a:ext uri="{FF2B5EF4-FFF2-40B4-BE49-F238E27FC236}">
+                <a16:creationId xmlns:a16="http://schemas.microsoft.com/office/drawing/2014/main" id="{A4B31EAA-7423-46F7-9B90-4AB2B09C35C4}"/>
+              </a:ext>
+              <a:ext uri="{C183D7F6-B498-43B3-948B-1728B52AA6E4}">
+                <adec:decorative xmlns:adec="http://schemas.microsoft.com/office/drawing/2017/decorative" val="1"/>
+              </a:ext>
+            </a:extLst>
+          </p:cNvPr>
+          <p:cNvSpPr>
+            <a:spLocks noGrp="1" noRot="1" noChangeAspect="1" noMove="1" noResize="1" noEditPoints="1" noAdjustHandles="1" noChangeArrowheads="1" noChangeShapeType="1" noTextEdit="1"/>
+          </p:cNvSpPr>
+          <p:nvPr>
+            <p:extLst>
+              <p:ext uri="{386F3935-93C4-4BCD-93E2-E3B085C9AB24}">
+                <p16:designElem xmlns:p16="http://schemas.microsoft.com/office/powerpoint/2015/main" val="1"/>
+              </p:ext>
+            </p:extLst>
+          </p:nvPr>
+        </p:nvSpPr>
+        <p:spPr>
+          <a:xfrm>
+            <a:off x="10437812" y="0"/>
+            <a:ext cx="685800" cy="1143000"/>
+          </a:xfrm>
+          <a:prstGeom prst="rect">
+            <a:avLst/>
+          </a:prstGeom>
+          <a:solidFill>
+            <a:schemeClr val="accent1"/>
+          </a:solidFill>
+          <a:ln>
+            <a:noFill/>
+          </a:ln>
+        </p:spPr>
+        <p:style>
+          <a:lnRef idx="1">
+            <a:schemeClr val="accent1"/>
+          </a:lnRef>
+          <a:fillRef idx="3">
+            <a:schemeClr val="accent1"/>
+          </a:fillRef>
+          <a:effectRef idx="2">
+            <a:schemeClr val="accent1"/>
+          </a:effectRef>
+          <a:fontRef idx="minor">
+            <a:schemeClr val="lt1"/>
+          </a:fontRef>
+        </p:style>
+      </p:sp>
+      <mc:AlternateContent xmlns:mc="http://schemas.openxmlformats.org/markup-compatibility/2006">
+        <mc:Choice xmlns:a14="http://schemas.microsoft.com/office/drawing/2010/main" Requires="a14">
+          <p:sp>
+            <p:nvSpPr>
+              <p:cNvPr id="4" name="Content Placeholder 4">
+                <a:extLst>
+                  <a:ext uri="{FF2B5EF4-FFF2-40B4-BE49-F238E27FC236}">
+                    <a16:creationId xmlns:a16="http://schemas.microsoft.com/office/drawing/2014/main" id="{ED3964BE-2E0C-CA4A-A99B-7E24F35E161F}"/>
+                  </a:ext>
+                </a:extLst>
+              </p:cNvPr>
+              <p:cNvSpPr txBox="1">
+                <a:spLocks/>
+              </p:cNvSpPr>
+              <p:nvPr/>
+            </p:nvSpPr>
+            <p:spPr>
+              <a:xfrm>
+                <a:off x="643855" y="3072385"/>
+                <a:ext cx="3108057" cy="2947415"/>
+              </a:xfrm>
+              <a:prstGeom prst="rect">
+                <a:avLst/>
+              </a:prstGeom>
+            </p:spPr>
+            <p:txBody>
+              <a:bodyPr vert="horz" lIns="91440" tIns="45720" rIns="91440" bIns="45720" rtlCol="0">
+                <a:normAutofit/>
+              </a:bodyPr>
+              <a:lstStyle>
+                <a:lvl1pPr marL="342900" indent="-342900" algn="l" defTabSz="457200" rtl="0" eaLnBrk="1" latinLnBrk="0" hangingPunct="1">
+                  <a:spcBef>
+                    <a:spcPts val="1000"/>
+                  </a:spcBef>
+                  <a:spcAft>
+                    <a:spcPts val="0"/>
+                  </a:spcAft>
+                  <a:buClr>
+                    <a:schemeClr val="bg2">
+                      <a:lumMod val="40000"/>
+                      <a:lumOff val="60000"/>
+                    </a:schemeClr>
+                  </a:buClr>
+                  <a:buSzPct val="80000"/>
+                  <a:buFont typeface="Wingdings 3" charset="2"/>
+                  <a:buChar char=""/>
+                  <a:defRPr sz="2000" b="0" i="0" kern="1200">
+                    <a:solidFill>
+                      <a:schemeClr val="tx1"/>
+                    </a:solidFill>
+                    <a:latin typeface="+mj-lt"/>
+                    <a:ea typeface="+mj-ea"/>
+                    <a:cs typeface="+mj-cs"/>
+                  </a:defRPr>
+                </a:lvl1pPr>
+                <a:lvl2pPr marL="742950" indent="-285750" algn="l" defTabSz="457200" rtl="0" eaLnBrk="1" latinLnBrk="0" hangingPunct="1">
+                  <a:spcBef>
+                    <a:spcPts val="1000"/>
+                  </a:spcBef>
+                  <a:spcAft>
+                    <a:spcPts val="0"/>
+                  </a:spcAft>
+                  <a:buClr>
+                    <a:schemeClr val="bg2">
+                      <a:lumMod val="40000"/>
+                      <a:lumOff val="60000"/>
+                    </a:schemeClr>
+                  </a:buClr>
+                  <a:buSzPct val="80000"/>
+                  <a:buFont typeface="Wingdings 3" charset="2"/>
+                  <a:buChar char=""/>
+                  <a:defRPr sz="1800" b="0" i="0" kern="1200">
+                    <a:solidFill>
+                      <a:schemeClr val="tx1"/>
+                    </a:solidFill>
+                    <a:latin typeface="+mj-lt"/>
+                    <a:ea typeface="+mj-ea"/>
+                    <a:cs typeface="+mj-cs"/>
+                  </a:defRPr>
+                </a:lvl2pPr>
+                <a:lvl3pPr marL="1143000" indent="-228600" algn="l" defTabSz="457200" rtl="0" eaLnBrk="1" latinLnBrk="0" hangingPunct="1">
+                  <a:spcBef>
+                    <a:spcPts val="1000"/>
+                  </a:spcBef>
+                  <a:spcAft>
+                    <a:spcPts val="0"/>
+                  </a:spcAft>
+                  <a:buClr>
+                    <a:schemeClr val="bg2">
+                      <a:lumMod val="40000"/>
+                      <a:lumOff val="60000"/>
+                    </a:schemeClr>
+                  </a:buClr>
+                  <a:buSzPct val="80000"/>
+                  <a:buFont typeface="Wingdings 3" charset="2"/>
+                  <a:buChar char=""/>
+                  <a:defRPr sz="1600" b="0" i="0" kern="1200">
+                    <a:solidFill>
+                      <a:schemeClr val="tx1"/>
+                    </a:solidFill>
+                    <a:latin typeface="+mj-lt"/>
+                    <a:ea typeface="+mj-ea"/>
+                    <a:cs typeface="+mj-cs"/>
+                  </a:defRPr>
+                </a:lvl3pPr>
+                <a:lvl4pPr marL="1600200" indent="-228600" algn="l" defTabSz="457200" rtl="0" eaLnBrk="1" latinLnBrk="0" hangingPunct="1">
+                  <a:spcBef>
+                    <a:spcPts val="1000"/>
+                  </a:spcBef>
+                  <a:spcAft>
+                    <a:spcPts val="0"/>
+                  </a:spcAft>
+                  <a:buClr>
+                    <a:schemeClr val="bg2">
+                      <a:lumMod val="40000"/>
+                      <a:lumOff val="60000"/>
+                    </a:schemeClr>
+                  </a:buClr>
+                  <a:buSzPct val="80000"/>
+                  <a:buFont typeface="Wingdings 3" charset="2"/>
+                  <a:buChar char=""/>
+                  <a:defRPr sz="1400" b="0" i="0" kern="1200">
+                    <a:solidFill>
+                      <a:schemeClr val="tx1"/>
+                    </a:solidFill>
+                    <a:latin typeface="+mj-lt"/>
+                    <a:ea typeface="+mj-ea"/>
+                    <a:cs typeface="+mj-cs"/>
+                  </a:defRPr>
+                </a:lvl4pPr>
+                <a:lvl5pPr marL="2057400" indent="-228600" algn="l" defTabSz="457200" rtl="0" eaLnBrk="1" latinLnBrk="0" hangingPunct="1">
+                  <a:spcBef>
+                    <a:spcPts val="1000"/>
+                  </a:spcBef>
+                  <a:spcAft>
+                    <a:spcPts val="0"/>
+                  </a:spcAft>
+                  <a:buClr>
+                    <a:schemeClr val="bg2">
+                      <a:lumMod val="40000"/>
+                      <a:lumOff val="60000"/>
+                    </a:schemeClr>
+                  </a:buClr>
+                  <a:buSzPct val="80000"/>
+                  <a:buFont typeface="Wingdings 3" charset="2"/>
+                  <a:buChar char=""/>
+                  <a:defRPr sz="1400" b="0" i="0" kern="1200">
+                    <a:solidFill>
+                      <a:schemeClr val="tx1"/>
+                    </a:solidFill>
+                    <a:latin typeface="+mj-lt"/>
+                    <a:ea typeface="+mj-ea"/>
+                    <a:cs typeface="+mj-cs"/>
+                  </a:defRPr>
+                </a:lvl5pPr>
+                <a:lvl6pPr marL="2506000" indent="-228600" algn="l" defTabSz="457200" rtl="0" eaLnBrk="1" latinLnBrk="0" hangingPunct="1">
+                  <a:spcBef>
+                    <a:spcPts val="1000"/>
+                  </a:spcBef>
+                  <a:spcAft>
+                    <a:spcPts val="0"/>
+                  </a:spcAft>
+                  <a:buClr>
+                    <a:schemeClr val="bg2">
+                      <a:lumMod val="40000"/>
+                      <a:lumOff val="60000"/>
+                    </a:schemeClr>
+                  </a:buClr>
+                  <a:buSzPct val="80000"/>
+                  <a:buFont typeface="Wingdings 3" charset="2"/>
+                  <a:buChar char=""/>
+                  <a:defRPr sz="1400" b="0" i="0" kern="1200">
+                    <a:solidFill>
+                      <a:schemeClr val="tx1"/>
+                    </a:solidFill>
+                    <a:latin typeface="+mj-lt"/>
+                    <a:ea typeface="+mj-ea"/>
+                    <a:cs typeface="+mj-cs"/>
+                  </a:defRPr>
+                </a:lvl6pPr>
+                <a:lvl7pPr marL="2971800" indent="-228600" algn="l" defTabSz="457200" rtl="0" eaLnBrk="1" latinLnBrk="0" hangingPunct="1">
+                  <a:spcBef>
+                    <a:spcPts val="1000"/>
+                  </a:spcBef>
+                  <a:spcAft>
+                    <a:spcPts val="0"/>
+                  </a:spcAft>
+                  <a:buClr>
+                    <a:schemeClr val="bg2">
+                      <a:lumMod val="40000"/>
+                      <a:lumOff val="60000"/>
+                    </a:schemeClr>
+                  </a:buClr>
+                  <a:buSzPct val="80000"/>
+                  <a:buFont typeface="Wingdings 3" charset="2"/>
+                  <a:buChar char=""/>
+                  <a:defRPr sz="1400" b="0" i="0" kern="1200">
+                    <a:solidFill>
+                      <a:schemeClr val="tx1"/>
+                    </a:solidFill>
+                    <a:latin typeface="+mj-lt"/>
+                    <a:ea typeface="+mj-ea"/>
+                    <a:cs typeface="+mj-cs"/>
+                  </a:defRPr>
+                </a:lvl7pPr>
+                <a:lvl8pPr marL="3429000" indent="-228600" algn="l" defTabSz="457200" rtl="0" eaLnBrk="1" latinLnBrk="0" hangingPunct="1">
+                  <a:spcBef>
+                    <a:spcPts val="1000"/>
+                  </a:spcBef>
+                  <a:spcAft>
+                    <a:spcPts val="0"/>
+                  </a:spcAft>
+                  <a:buClr>
+                    <a:schemeClr val="bg2">
+                      <a:lumMod val="40000"/>
+                      <a:lumOff val="60000"/>
+                    </a:schemeClr>
+                  </a:buClr>
+                  <a:buSzPct val="80000"/>
+                  <a:buFont typeface="Wingdings 3" charset="2"/>
+                  <a:buChar char=""/>
+                  <a:defRPr sz="1400" b="0" i="0" kern="1200">
+                    <a:solidFill>
+                      <a:schemeClr val="tx1"/>
+                    </a:solidFill>
+                    <a:latin typeface="+mj-lt"/>
+                    <a:ea typeface="+mj-ea"/>
+                    <a:cs typeface="+mj-cs"/>
+                  </a:defRPr>
+                </a:lvl8pPr>
+                <a:lvl9pPr marL="3886200" indent="-228600" algn="l" defTabSz="457200" rtl="0" eaLnBrk="1" latinLnBrk="0" hangingPunct="1">
+                  <a:spcBef>
+                    <a:spcPts val="1000"/>
+                  </a:spcBef>
+                  <a:spcAft>
+                    <a:spcPts val="0"/>
+                  </a:spcAft>
+                  <a:buClr>
+                    <a:schemeClr val="bg2">
+                      <a:lumMod val="40000"/>
+                      <a:lumOff val="60000"/>
+                    </a:schemeClr>
+                  </a:buClr>
+                  <a:buSzPct val="80000"/>
+                  <a:buFont typeface="Wingdings 3" charset="2"/>
+                  <a:buChar char=""/>
+                  <a:defRPr sz="1400" b="0" i="0" kern="1200">
+                    <a:solidFill>
+                      <a:schemeClr val="tx1"/>
+                    </a:solidFill>
+                    <a:latin typeface="+mj-lt"/>
+                    <a:ea typeface="+mj-ea"/>
+                    <a:cs typeface="+mj-cs"/>
+                  </a:defRPr>
+                </a:lvl9pPr>
+              </a:lstStyle>
+              <a:p>
+                <a:r>
+                  <a:rPr lang="en-US" sz="1400" dirty="0">
+                    <a:solidFill>
+                      <a:srgbClr val="FFFFFF"/>
+                    </a:solidFill>
+                  </a:rPr>
+                  <a:t>Run the regression</a:t>
+                </a:r>
+              </a:p>
+              <a:p>
+                <a:pPr marL="0" indent="0">
+                  <a:buNone/>
+                </a:pPr>
+                <a14:m>
+                  <m:oMathPara xmlns:m="http://schemas.openxmlformats.org/officeDocument/2006/math">
+                    <m:oMathParaPr>
+                      <m:jc m:val="centerGroup"/>
+                    </m:oMathParaPr>
+                    <m:oMath xmlns:m="http://schemas.openxmlformats.org/officeDocument/2006/math">
+                      <m:sSubSup>
+                        <m:sSubSupPr>
+                          <m:ctrlPr>
+                            <a:rPr lang="en-US" sz="1400" b="0" i="1" smtClean="0">
+                              <a:solidFill>
+                                <a:srgbClr val="FFFFFF"/>
+                              </a:solidFill>
+                              <a:latin typeface="Cambria Math" panose="02040503050406030204" pitchFamily="18" charset="0"/>
+                            </a:rPr>
+                          </m:ctrlPr>
+                        </m:sSubSupPr>
+                        <m:e>
+                          <m:r>
+                            <a:rPr lang="en-US" sz="1400" b="0" i="1" smtClean="0">
+                              <a:solidFill>
+                                <a:srgbClr val="FFFFFF"/>
+                              </a:solidFill>
+                              <a:latin typeface="Cambria Math" panose="02040503050406030204" pitchFamily="18" charset="0"/>
+                            </a:rPr>
+                            <m:t>𝜎</m:t>
+                          </m:r>
+                        </m:e>
+                        <m:sub>
+                          <m:r>
+                            <a:rPr lang="en-US" sz="1400" b="0" i="1" smtClean="0">
+                              <a:solidFill>
+                                <a:srgbClr val="FFFFFF"/>
+                              </a:solidFill>
+                              <a:latin typeface="Cambria Math" panose="02040503050406030204" pitchFamily="18" charset="0"/>
+                            </a:rPr>
+                            <m:t>𝑡</m:t>
+                          </m:r>
+                        </m:sub>
+                        <m:sup/>
+                      </m:sSubSup>
+                      <m:r>
+                        <a:rPr lang="en-US" sz="1400" b="0" i="1" smtClean="0">
+                          <a:solidFill>
+                            <a:srgbClr val="FFFFFF"/>
+                          </a:solidFill>
+                          <a:latin typeface="Cambria Math" panose="02040503050406030204" pitchFamily="18" charset="0"/>
+                        </a:rPr>
+                        <m:t>=</m:t>
+                      </m:r>
+                      <m:r>
+                        <a:rPr lang="en-US" sz="1400" b="0" i="1" smtClean="0">
+                          <a:solidFill>
+                            <a:srgbClr val="FFFFFF"/>
+                          </a:solidFill>
+                          <a:latin typeface="Cambria Math" panose="02040503050406030204" pitchFamily="18" charset="0"/>
+                        </a:rPr>
+                        <m:t>𝛼</m:t>
+                      </m:r>
+                      <m:r>
+                        <a:rPr lang="en-US" sz="1400" b="0" i="1" smtClean="0">
+                          <a:solidFill>
+                            <a:srgbClr val="FFFFFF"/>
+                          </a:solidFill>
+                          <a:latin typeface="Cambria Math" panose="02040503050406030204" pitchFamily="18" charset="0"/>
+                        </a:rPr>
+                        <m:t>+</m:t>
+                      </m:r>
+                      <m:sSub>
+                        <m:sSubPr>
+                          <m:ctrlPr>
+                            <a:rPr lang="en-US" sz="1400" b="0" i="1" smtClean="0">
+                              <a:solidFill>
+                                <a:srgbClr val="FFFFFF"/>
+                              </a:solidFill>
+                              <a:latin typeface="Cambria Math" panose="02040503050406030204" pitchFamily="18" charset="0"/>
+                            </a:rPr>
+                          </m:ctrlPr>
+                        </m:sSubPr>
+                        <m:e>
+                          <m:r>
+                            <a:rPr lang="en-US" sz="1400" b="0" i="1" smtClean="0">
+                              <a:solidFill>
+                                <a:srgbClr val="FFFFFF"/>
+                              </a:solidFill>
+                              <a:latin typeface="Cambria Math" panose="02040503050406030204" pitchFamily="18" charset="0"/>
+                            </a:rPr>
+                            <m:t>𝛽</m:t>
+                          </m:r>
+                        </m:e>
+                        <m:sub>
+                          <m:r>
+                            <a:rPr lang="en-US" sz="1400" b="0" i="1" smtClean="0">
+                              <a:solidFill>
+                                <a:srgbClr val="FFFFFF"/>
+                              </a:solidFill>
+                              <a:latin typeface="Cambria Math" panose="02040503050406030204" pitchFamily="18" charset="0"/>
+                            </a:rPr>
+                            <m:t>𝑉𝐼𝑋</m:t>
+                          </m:r>
+                        </m:sub>
+                      </m:sSub>
+                      <m:r>
+                        <a:rPr lang="en-US" sz="1400" b="0" i="1" smtClean="0">
+                          <a:solidFill>
+                            <a:srgbClr val="FFFFFF"/>
+                          </a:solidFill>
+                          <a:latin typeface="Cambria Math" panose="02040503050406030204" pitchFamily="18" charset="0"/>
+                        </a:rPr>
+                        <m:t> . </m:t>
+                      </m:r>
+                      <m:r>
+                        <a:rPr lang="en-US" sz="1400" b="0" i="1" smtClean="0">
+                          <a:solidFill>
+                            <a:srgbClr val="FFFFFF"/>
+                          </a:solidFill>
+                          <a:latin typeface="Cambria Math" panose="02040503050406030204" pitchFamily="18" charset="0"/>
+                        </a:rPr>
+                        <m:t>𝑉𝐼</m:t>
+                      </m:r>
+                      <m:sSub>
+                        <m:sSubPr>
+                          <m:ctrlPr>
+                            <a:rPr lang="en-US" sz="1400" b="0" i="1" smtClean="0">
+                              <a:solidFill>
+                                <a:srgbClr val="FFFFFF"/>
+                              </a:solidFill>
+                              <a:latin typeface="Cambria Math" panose="02040503050406030204" pitchFamily="18" charset="0"/>
+                            </a:rPr>
+                          </m:ctrlPr>
+                        </m:sSubPr>
+                        <m:e>
+                          <m:r>
+                            <a:rPr lang="en-US" sz="1400" b="0" i="1" smtClean="0">
+                              <a:solidFill>
+                                <a:srgbClr val="FFFFFF"/>
+                              </a:solidFill>
+                              <a:latin typeface="Cambria Math" panose="02040503050406030204" pitchFamily="18" charset="0"/>
+                            </a:rPr>
+                            <m:t>𝑋</m:t>
+                          </m:r>
+                        </m:e>
+                        <m:sub>
+                          <m:r>
+                            <a:rPr lang="en-US" sz="1400" b="0" i="1" smtClean="0">
+                              <a:solidFill>
+                                <a:srgbClr val="FFFFFF"/>
+                              </a:solidFill>
+                              <a:latin typeface="Cambria Math" panose="02040503050406030204" pitchFamily="18" charset="0"/>
+                            </a:rPr>
+                            <m:t>𝑡</m:t>
+                          </m:r>
+                        </m:sub>
+                      </m:sSub>
+                      <m:r>
+                        <a:rPr lang="en-US" sz="1400" b="0" i="1" smtClean="0">
+                          <a:solidFill>
+                            <a:srgbClr val="FFFFFF"/>
+                          </a:solidFill>
+                          <a:latin typeface="Cambria Math" panose="02040503050406030204" pitchFamily="18" charset="0"/>
+                        </a:rPr>
+                        <m:t>+</m:t>
+                      </m:r>
+                      <m:sSub>
+                        <m:sSubPr>
+                          <m:ctrlPr>
+                            <a:rPr lang="en-US" sz="1400" b="0" i="1" smtClean="0">
+                              <a:solidFill>
+                                <a:srgbClr val="FFFFFF"/>
+                              </a:solidFill>
+                              <a:latin typeface="Cambria Math" panose="02040503050406030204" pitchFamily="18" charset="0"/>
+                            </a:rPr>
+                          </m:ctrlPr>
+                        </m:sSubPr>
+                        <m:e>
+                          <m:r>
+                            <a:rPr lang="en-US" sz="1400" b="0" i="1" smtClean="0">
+                              <a:solidFill>
+                                <a:srgbClr val="FFFFFF"/>
+                              </a:solidFill>
+                              <a:latin typeface="Cambria Math" panose="02040503050406030204" pitchFamily="18" charset="0"/>
+                            </a:rPr>
+                            <m:t>𝛽</m:t>
+                          </m:r>
+                        </m:e>
+                        <m:sub>
+                          <m:r>
+                            <a:rPr lang="en-US" sz="1400" b="0" i="1" smtClean="0">
+                              <a:solidFill>
+                                <a:srgbClr val="FFFFFF"/>
+                              </a:solidFill>
+                              <a:latin typeface="Cambria Math" panose="02040503050406030204" pitchFamily="18" charset="0"/>
+                            </a:rPr>
+                            <m:t>𝑃𝑜𝑝𝑢𝑙𝑎𝑟𝑖𝑡𝑦</m:t>
+                          </m:r>
+                        </m:sub>
+                      </m:sSub>
+                      <m:r>
+                        <a:rPr lang="en-US" sz="1400" b="0" i="1" smtClean="0">
+                          <a:solidFill>
+                            <a:srgbClr val="FFFFFF"/>
+                          </a:solidFill>
+                          <a:latin typeface="Cambria Math" panose="02040503050406030204" pitchFamily="18" charset="0"/>
+                        </a:rPr>
+                        <m:t> . </m:t>
+                      </m:r>
+                      <m:r>
+                        <a:rPr lang="en-US" sz="1400" b="0" i="1" smtClean="0">
+                          <a:solidFill>
+                            <a:srgbClr val="FFFFFF"/>
+                          </a:solidFill>
+                          <a:latin typeface="Cambria Math" panose="02040503050406030204" pitchFamily="18" charset="0"/>
+                        </a:rPr>
+                        <m:t>𝑃𝑜𝑝𝑢𝑙𝑎𝑟𝑖𝑡</m:t>
+                      </m:r>
+                      <m:sSub>
+                        <m:sSubPr>
+                          <m:ctrlPr>
+                            <a:rPr lang="en-US" sz="1400" b="0" i="1" smtClean="0">
+                              <a:solidFill>
+                                <a:srgbClr val="FFFFFF"/>
+                              </a:solidFill>
+                              <a:latin typeface="Cambria Math" panose="02040503050406030204" pitchFamily="18" charset="0"/>
+                            </a:rPr>
+                          </m:ctrlPr>
+                        </m:sSubPr>
+                        <m:e>
+                          <m:r>
+                            <a:rPr lang="en-US" sz="1400" b="0" i="1" smtClean="0">
+                              <a:solidFill>
+                                <a:srgbClr val="FFFFFF"/>
+                              </a:solidFill>
+                              <a:latin typeface="Cambria Math" panose="02040503050406030204" pitchFamily="18" charset="0"/>
+                            </a:rPr>
+                            <m:t>𝑦</m:t>
+                          </m:r>
+                        </m:e>
+                        <m:sub>
+                          <m:r>
+                            <a:rPr lang="en-US" sz="1400" b="0" i="1" smtClean="0">
+                              <a:solidFill>
+                                <a:srgbClr val="FFFFFF"/>
+                              </a:solidFill>
+                              <a:latin typeface="Cambria Math" panose="02040503050406030204" pitchFamily="18" charset="0"/>
+                            </a:rPr>
+                            <m:t>𝑡</m:t>
+                          </m:r>
+                        </m:sub>
+                      </m:sSub>
+                    </m:oMath>
+                  </m:oMathPara>
+                </a14:m>
+                <a:endParaRPr lang="en-US" sz="1400" b="0" dirty="0">
+                  <a:solidFill>
+                    <a:srgbClr val="FFFFFF"/>
+                  </a:solidFill>
+                </a:endParaRPr>
+              </a:p>
+              <a:p>
+                <a:pPr marL="0" indent="0">
+                  <a:buNone/>
+                </a:pPr>
+                <a:r>
+                  <a:rPr lang="en-US" sz="1400" dirty="0">
+                    <a:solidFill>
+                      <a:srgbClr val="FFFFFF"/>
+                    </a:solidFill>
+                  </a:rPr>
+                  <a:t>for each of the 15 most popular stocks available in the dataset</a:t>
+                </a:r>
+              </a:p>
+              <a:p>
+                <a:r>
+                  <a:rPr lang="en-US" sz="1400" dirty="0">
+                    <a:solidFill>
+                      <a:srgbClr val="FFFFFF"/>
+                    </a:solidFill>
+                  </a:rPr>
+                  <a:t>Test </a:t>
+                </a:r>
+                <a14:m>
+                  <m:oMath xmlns:m="http://schemas.openxmlformats.org/officeDocument/2006/math">
+                    <m:sSub>
+                      <m:sSubPr>
+                        <m:ctrlPr>
+                          <a:rPr lang="en-US" sz="1400" b="0" i="1" smtClean="0">
+                            <a:solidFill>
+                              <a:srgbClr val="FFFFFF"/>
+                            </a:solidFill>
+                            <a:latin typeface="Cambria Math" panose="02040503050406030204" pitchFamily="18" charset="0"/>
+                          </a:rPr>
+                        </m:ctrlPr>
+                      </m:sSubPr>
+                      <m:e>
+                        <m:r>
+                          <a:rPr lang="en-US" sz="1400" b="0" i="1" smtClean="0">
+                            <a:solidFill>
+                              <a:srgbClr val="FFFFFF"/>
+                            </a:solidFill>
+                            <a:latin typeface="Cambria Math" panose="02040503050406030204" pitchFamily="18" charset="0"/>
+                          </a:rPr>
+                          <m:t>𝛽</m:t>
+                        </m:r>
+                      </m:e>
+                      <m:sub>
+                        <m:r>
+                          <a:rPr lang="en-US" sz="1400" b="0" i="1" smtClean="0">
+                            <a:solidFill>
+                              <a:srgbClr val="FFFFFF"/>
+                            </a:solidFill>
+                            <a:latin typeface="Cambria Math" panose="02040503050406030204" pitchFamily="18" charset="0"/>
+                          </a:rPr>
+                          <m:t>𝑃𝑜𝑝𝑢𝑙𝑎𝑟𝑖𝑡𝑦</m:t>
+                        </m:r>
+                      </m:sub>
+                    </m:sSub>
+                    <m:r>
+                      <a:rPr lang="en-US" sz="1400" b="0" i="1" smtClean="0">
+                        <a:solidFill>
+                          <a:srgbClr val="FFFFFF"/>
+                        </a:solidFill>
+                        <a:latin typeface="Cambria Math" panose="02040503050406030204" pitchFamily="18" charset="0"/>
+                      </a:rPr>
+                      <m:t>=0</m:t>
+                    </m:r>
+                  </m:oMath>
+                </a14:m>
+                <a:endParaRPr lang="en-US" sz="1400" dirty="0">
+                  <a:solidFill>
+                    <a:srgbClr val="FFFFFF"/>
+                  </a:solidFill>
+                </a:endParaRPr>
+              </a:p>
+              <a:p>
+                <a:pPr lvl="1"/>
+                <a:r>
+                  <a:rPr lang="en-US" sz="1200" dirty="0">
+                    <a:solidFill>
+                      <a:srgbClr val="FFFFFF"/>
+                    </a:solidFill>
+                  </a:rPr>
+                  <a:t>Beyond the VIX and individual stock intercept, does Robinhood usage correlate with stock volatility?</a:t>
+                </a:r>
+              </a:p>
+            </p:txBody>
+          </p:sp>
+        </mc:Choice>
+        <mc:Fallback>
+          <p:sp>
+            <p:nvSpPr>
+              <p:cNvPr id="4" name="Content Placeholder 4">
+                <a:extLst>
+                  <a:ext uri="{FF2B5EF4-FFF2-40B4-BE49-F238E27FC236}">
+                    <a16:creationId xmlns:a16="http://schemas.microsoft.com/office/drawing/2014/main" id="{ED3964BE-2E0C-CA4A-A99B-7E24F35E161F}"/>
+                  </a:ext>
+                </a:extLst>
+              </p:cNvPr>
+              <p:cNvSpPr txBox="1">
+                <a:spLocks noRot="1" noChangeAspect="1" noMove="1" noResize="1" noEditPoints="1" noAdjustHandles="1" noChangeArrowheads="1" noChangeShapeType="1" noTextEdit="1"/>
+              </p:cNvSpPr>
+              <p:nvPr/>
+            </p:nvSpPr>
+            <p:spPr>
+              <a:xfrm>
+                <a:off x="643855" y="3072385"/>
+                <a:ext cx="3108057" cy="2947415"/>
+              </a:xfrm>
+              <a:prstGeom prst="rect">
+                <a:avLst/>
+              </a:prstGeom>
+              <a:blipFill>
+                <a:blip r:embed="rId2"/>
+                <a:stretch>
+                  <a:fillRect l="-813" t="-427"/>
+                </a:stretch>
+              </a:blipFill>
+            </p:spPr>
+            <p:txBody>
+              <a:bodyPr/>
+              <a:lstStyle/>
+              <a:p>
+                <a:r>
+                  <a:rPr lang="en-FR">
+                    <a:noFill/>
+                  </a:rPr>
+                  <a:t> </a:t>
+                </a:r>
+              </a:p>
+            </p:txBody>
+          </p:sp>
+        </mc:Fallback>
+      </mc:AlternateContent>
+      <p:pic>
+        <p:nvPicPr>
+          <p:cNvPr id="6" name="Content Placeholder 5">
+            <a:extLst>
+              <a:ext uri="{FF2B5EF4-FFF2-40B4-BE49-F238E27FC236}">
+                <a16:creationId xmlns:a16="http://schemas.microsoft.com/office/drawing/2014/main" id="{0E9A6221-DCD8-4C46-8AEB-E996ECE0CF35}"/>
+              </a:ext>
+            </a:extLst>
+          </p:cNvPr>
+          <p:cNvPicPr>
+            <a:picLocks noGrp="1" noChangeAspect="1"/>
+          </p:cNvPicPr>
           <p:nvPr>
             <p:ph idx="1"/>
           </p:nvPr>
-        </p:nvSpPr>
-        <p:spPr/>
-        <p:txBody>
-          <a:bodyPr/>
-          <a:lstStyle/>
-          <a:p>
-            <a:endParaRPr lang="en-FR" dirty="0"/>
-          </a:p>
-        </p:txBody>
-      </p:sp>
+        </p:nvPicPr>
+        <p:blipFill>
+          <a:blip r:embed="rId3"/>
+          <a:srcRect/>
+          <a:stretch/>
+        </p:blipFill>
+        <p:spPr>
+          <a:xfrm>
+            <a:off x="5048451" y="2109838"/>
+            <a:ext cx="6495846" cy="3247923"/>
+          </a:xfrm>
+          <a:prstGeom prst="rect">
+            <a:avLst/>
+          </a:prstGeom>
+          <a:effectLst/>
+        </p:spPr>
+      </p:pic>
     </p:spTree>
     <p:extLst>
       <p:ext uri="{BB962C8B-B14F-4D97-AF65-F5344CB8AC3E}">
@@ -15513,7 +17167,7 @@
     </p:extLst>
   </p:cSld>
   <p:clrMapOvr>
-    <a:masterClrMapping/>
+    <a:overrideClrMapping bg1="lt1" tx1="dk1" bg2="lt2" tx2="dk2" accent1="accent1" accent2="accent2" accent3="accent3" accent4="accent4" accent5="accent5" accent6="accent6" hlink="hlink" folHlink="folHlink"/>
   </p:clrMapOvr>
 </p:sld>
 </file>
@@ -16217,6 +17871,13 @@
             <a:r>
               <a:rPr lang="en-GB" dirty="0"/>
               <a:t>The number of shares held for each company is proportional to the number of users who own that share</a:t>
+            </a:r>
+          </a:p>
+          <a:p>
+            <a:pPr lvl="2"/>
+            <a:r>
+              <a:rPr lang="en-GB" dirty="0"/>
+              <a:t>A strong assumption, because more expensive shares may be held in lesser quantity</a:t>
             </a:r>
           </a:p>
           <a:p>
@@ -22855,7 +24516,7 @@
                       <a:srgbClr val="FFFFFF"/>
                     </a:solidFill>
                   </a:rPr>
-                  <a:t> is a given cut-off value beyond which we want to measure the fatness of the tail (the 95th percentile and 99th percentile of absolute returns).</a:t>
+                  <a:t> is a given cut-off value beyond which we want to measure the fatness of the tail (here, taken to be the 95th percentile and 99th percentile of absolute returns).</a:t>
                 </a:r>
               </a:p>
             </p:txBody>
@@ -22886,7 +24547,7 @@
               <a:blipFill>
                 <a:blip r:embed="rId2"/>
                 <a:stretch>
-                  <a:fillRect l="-901" t="-2676" b="-669"/>
+                  <a:fillRect l="-901" t="-2676" r="-450" b="-5351"/>
                 </a:stretch>
               </a:blipFill>
             </p:spPr>
@@ -23282,7 +24943,7 @@
               </a:lnSpc>
             </a:pPr>
             <a:r>
-              <a:rPr lang="en-FR" sz="3600">
+              <a:rPr lang="en-FR" sz="3600" dirty="0">
                 <a:solidFill>
                   <a:srgbClr val="EBEBEB"/>
                 </a:solidFill>
@@ -24206,7 +25867,7 @@
                       <m:sSubSup>
                         <m:sSubSupPr>
                           <m:ctrlPr>
-                            <a:rPr lang="en-US" b="0" i="1">
+                            <a:rPr lang="en-US" b="0" i="1" smtClean="0">
                               <a:solidFill>
                                 <a:srgbClr val="FFFFFF"/>
                               </a:solidFill>
@@ -24276,12 +25937,112 @@
                           </a:solidFill>
                           <a:latin typeface="Cambria Math" panose="02040503050406030204" pitchFamily="18" charset="0"/>
                         </a:rPr>
-                        <m:t> (</m:t>
+                        <m:t> </m:t>
+                      </m:r>
+                      <m:d>
+                        <m:dPr>
+                          <m:ctrlPr>
+                            <a:rPr lang="en-US" b="0" i="1">
+                              <a:solidFill>
+                                <a:srgbClr val="FFFFFF"/>
+                              </a:solidFill>
+                              <a:latin typeface="Cambria Math" panose="02040503050406030204" pitchFamily="18" charset="0"/>
+                            </a:rPr>
+                          </m:ctrlPr>
+                        </m:dPr>
+                        <m:e>
+                          <m:sSub>
+                            <m:sSubPr>
+                              <m:ctrlPr>
+                                <a:rPr lang="en-US" b="0" i="1">
+                                  <a:solidFill>
+                                    <a:srgbClr val="FFFFFF"/>
+                                  </a:solidFill>
+                                  <a:latin typeface="Cambria Math" panose="02040503050406030204" pitchFamily="18" charset="0"/>
+                                </a:rPr>
+                              </m:ctrlPr>
+                            </m:sSubPr>
+                            <m:e>
+                              <m:r>
+                                <a:rPr lang="en-US" b="0" i="1">
+                                  <a:solidFill>
+                                    <a:srgbClr val="FFFFFF"/>
+                                  </a:solidFill>
+                                  <a:latin typeface="Cambria Math" panose="02040503050406030204" pitchFamily="18" charset="0"/>
+                                </a:rPr>
+                                <m:t>𝑅</m:t>
+                              </m:r>
+                            </m:e>
+                            <m:sub>
+                              <m:r>
+                                <a:rPr lang="en-US" b="0" i="1">
+                                  <a:solidFill>
+                                    <a:srgbClr val="FFFFFF"/>
+                                  </a:solidFill>
+                                  <a:latin typeface="Cambria Math" panose="02040503050406030204" pitchFamily="18" charset="0"/>
+                                </a:rPr>
+                                <m:t>𝑚</m:t>
+                              </m:r>
+                            </m:sub>
+                          </m:sSub>
+                          <m:r>
+                            <a:rPr lang="en-US" b="0" i="1">
+                              <a:solidFill>
+                                <a:srgbClr val="FFFFFF"/>
+                              </a:solidFill>
+                              <a:latin typeface="Cambria Math" panose="02040503050406030204" pitchFamily="18" charset="0"/>
+                            </a:rPr>
+                            <m:t>−</m:t>
+                          </m:r>
+                          <m:sSub>
+                            <m:sSubPr>
+                              <m:ctrlPr>
+                                <a:rPr lang="en-US" b="0" i="1">
+                                  <a:solidFill>
+                                    <a:srgbClr val="FFFFFF"/>
+                                  </a:solidFill>
+                                  <a:latin typeface="Cambria Math" panose="02040503050406030204" pitchFamily="18" charset="0"/>
+                                </a:rPr>
+                              </m:ctrlPr>
+                            </m:sSubPr>
+                            <m:e>
+                              <m:r>
+                                <a:rPr lang="en-US" b="0" i="1">
+                                  <a:solidFill>
+                                    <a:srgbClr val="FFFFFF"/>
+                                  </a:solidFill>
+                                  <a:latin typeface="Cambria Math" panose="02040503050406030204" pitchFamily="18" charset="0"/>
+                                </a:rPr>
+                                <m:t>𝑅</m:t>
+                              </m:r>
+                            </m:e>
+                            <m:sub>
+                              <m:r>
+                                <a:rPr lang="en-US" b="0" i="1">
+                                  <a:solidFill>
+                                    <a:srgbClr val="FFFFFF"/>
+                                  </a:solidFill>
+                                  <a:latin typeface="Cambria Math" panose="02040503050406030204" pitchFamily="18" charset="0"/>
+                                </a:rPr>
+                                <m:t>𝑓</m:t>
+                              </m:r>
+                            </m:sub>
+                          </m:sSub>
+                        </m:e>
+                      </m:d>
+                      <m:r>
+                        <a:rPr lang="en-US" b="0" i="1" smtClean="0">
+                          <a:solidFill>
+                            <a:srgbClr val="FFFFFF"/>
+                          </a:solidFill>
+                          <a:latin typeface="Cambria Math" panose="02040503050406030204" pitchFamily="18" charset="0"/>
+                        </a:rPr>
+                        <m:t>+</m:t>
                       </m:r>
                       <m:sSub>
                         <m:sSubPr>
                           <m:ctrlPr>
-                            <a:rPr lang="en-US" b="0" i="1">
+                            <a:rPr lang="en-US" b="0" i="1" smtClean="0">
                               <a:solidFill>
                                 <a:srgbClr val="FFFFFF"/>
                               </a:solidFill>
@@ -24291,83 +26052,31 @@
                         </m:sSubPr>
                         <m:e>
                           <m:r>
-                            <a:rPr lang="en-US" b="0" i="1">
+                            <a:rPr lang="en-US" b="0" i="1" smtClean="0">
                               <a:solidFill>
                                 <a:srgbClr val="FFFFFF"/>
                               </a:solidFill>
                               <a:latin typeface="Cambria Math" panose="02040503050406030204" pitchFamily="18" charset="0"/>
                             </a:rPr>
-                            <m:t>𝑅</m:t>
+                            <m:t>𝜖</m:t>
                           </m:r>
                         </m:e>
                         <m:sub>
                           <m:r>
-                            <a:rPr lang="en-US" b="0" i="1">
+                            <a:rPr lang="en-US" b="0" i="1" smtClean="0">
                               <a:solidFill>
                                 <a:srgbClr val="FFFFFF"/>
                               </a:solidFill>
                               <a:latin typeface="Cambria Math" panose="02040503050406030204" pitchFamily="18" charset="0"/>
                             </a:rPr>
-                            <m:t>𝑚</m:t>
+                            <m:t>𝑡</m:t>
                           </m:r>
                         </m:sub>
                       </m:sSub>
-                      <m:r>
-                        <a:rPr lang="en-US" b="0" i="1">
-                          <a:solidFill>
-                            <a:srgbClr val="FFFFFF"/>
-                          </a:solidFill>
-                          <a:latin typeface="Cambria Math" panose="02040503050406030204" pitchFamily="18" charset="0"/>
-                        </a:rPr>
-                        <m:t>−</m:t>
-                      </m:r>
-                      <m:sSub>
-                        <m:sSubPr>
-                          <m:ctrlPr>
-                            <a:rPr lang="en-US" b="0" i="1">
-                              <a:solidFill>
-                                <a:srgbClr val="FFFFFF"/>
-                              </a:solidFill>
-                              <a:latin typeface="Cambria Math" panose="02040503050406030204" pitchFamily="18" charset="0"/>
-                            </a:rPr>
-                          </m:ctrlPr>
-                        </m:sSubPr>
-                        <m:e>
-                          <m:r>
-                            <a:rPr lang="en-US" b="0" i="1">
-                              <a:solidFill>
-                                <a:srgbClr val="FFFFFF"/>
-                              </a:solidFill>
-                              <a:latin typeface="Cambria Math" panose="02040503050406030204" pitchFamily="18" charset="0"/>
-                            </a:rPr>
-                            <m:t>𝑅</m:t>
-                          </m:r>
-                        </m:e>
-                        <m:sub>
-                          <m:r>
-                            <a:rPr lang="en-US" b="0" i="1">
-                              <a:solidFill>
-                                <a:srgbClr val="FFFFFF"/>
-                              </a:solidFill>
-                              <a:latin typeface="Cambria Math" panose="02040503050406030204" pitchFamily="18" charset="0"/>
-                            </a:rPr>
-                            <m:t>𝑓</m:t>
-                          </m:r>
-                        </m:sub>
-                      </m:sSub>
-                      <m:r>
-                        <a:rPr lang="en-US" b="0" i="1">
-                          <a:solidFill>
-                            <a:srgbClr val="FFFFFF"/>
-                          </a:solidFill>
-                          <a:latin typeface="Cambria Math" panose="02040503050406030204" pitchFamily="18" charset="0"/>
-                        </a:rPr>
-                        <m:t>)</m:t>
-                      </m:r>
                     </m:oMath>
                   </m:oMathPara>
                 </a14:m>
-                <a:endParaRPr lang="en-FR">
+                <a:endParaRPr lang="en-FR" dirty="0">
                   <a:solidFill>
                     <a:srgbClr val="FFFFFF"/>
                   </a:solidFill>
@@ -24375,28 +26084,17 @@
               </a:p>
               <a:p>
                 <a:r>
-                  <a:rPr lang="en-FR">
+                  <a:rPr lang="en-FR" dirty="0">
                     <a:solidFill>
                       <a:srgbClr val="FFFFFF"/>
                     </a:solidFill>
                   </a:rPr>
-                  <a:t>Daily alpha is economically and statistically significant</a:t>
-                </a:r>
-              </a:p>
-              <a:p>
-                <a:pPr lvl="1"/>
-                <a:r>
-                  <a:rPr lang="en-FR">
-                    <a:solidFill>
-                      <a:srgbClr val="FFFFFF"/>
-                    </a:solidFill>
-                  </a:rPr>
-                  <a:t>95% confidence interval is</a:t>
+                  <a:t>Daily alpha is economically and statistically insignificant</a:t>
                 </a:r>
               </a:p>
               <a:p>
                 <a:r>
-                  <a:rPr lang="en-FR">
+                  <a:rPr lang="en-FR" dirty="0">
                     <a:solidFill>
                       <a:srgbClr val="FFFFFF"/>
                     </a:solidFill>
@@ -24406,12 +26104,12 @@
               </a:p>
               <a:p>
                 <a:r>
-                  <a:rPr lang="en-FR">
+                  <a:rPr lang="en-FR" dirty="0">
                     <a:solidFill>
                       <a:srgbClr val="FFFFFF"/>
                     </a:solidFill>
                   </a:rPr>
-                  <a:t>Apparently good Annualized Investment Ratio (0.729) over the market is completely insignificant because of the lack of data</a:t>
+                  <a:t>Seemingly good Annualized Investment Ratio (0.729) over the market is completely insignificant (short time window)</a:t>
                 </a:r>
               </a:p>
             </p:txBody>
@@ -24442,7 +26140,7 @@
               <a:blipFill>
                 <a:blip r:embed="rId2"/>
                 <a:stretch>
-                  <a:fillRect l="-450" r="-450"/>
+                  <a:fillRect l="-450"/>
                 </a:stretch>
               </a:blipFill>
             </p:spPr>
@@ -25806,7 +27504,7 @@
             </a:r>
           </a:p>
           <a:p>
-            <a:pPr lvl="1"/>
+            <a:pPr lvl="2"/>
             <a:r>
               <a:rPr lang="en-FR" dirty="0"/>
               <a:t>Trendy Robinhood Stocks could benefit vast public popularity. Is Robinhood popularity a leading indicator of good performance? Wisdom of Crowds?</a:t>
@@ -29673,7 +31371,15 @@
           <a:p>
             <a:r>
               <a:rPr lang="en-FR" dirty="0"/>
-              <a:t>What are key behaviors of Robinhood traders?</a:t>
+              <a:t>What are key </a:t>
+            </a:r>
+            <a:r>
+              <a:rPr lang="en-FR" b="1" dirty="0"/>
+              <a:t>behaviors of Robinhood users</a:t>
+            </a:r>
+            <a:r>
+              <a:rPr lang="en-FR" dirty="0"/>
+              <a:t>?</a:t>
             </a:r>
           </a:p>
           <a:p>
@@ -30321,7 +32027,7 @@
             <p:ph idx="1"/>
             <p:extLst>
               <p:ext uri="{D42A27DB-BD31-4B8C-83A1-F6EECF244321}">
-                <p14:modId xmlns:p14="http://schemas.microsoft.com/office/powerpoint/2010/main" val="598650101"/>
+                <p14:modId xmlns:p14="http://schemas.microsoft.com/office/powerpoint/2010/main" val="2238298031"/>
               </p:ext>
             </p:extLst>
           </p:nvPr>
@@ -30611,7 +32317,7 @@
                       <a:pPr lvl="3"/>
                       <a:r>
                         <a:rPr lang="en-GB" dirty="0"/>
-                        <a:t>Rebalancing</a:t>
+                        <a:t>Rebalancing?</a:t>
                       </a:r>
                     </a:p>
                   </a:txBody>

</xml_diff>